<commit_message>
Add QR code to repository to the slides.
</commit_message>
<xml_diff>
--- a/Slides/QLS-MiCM Intro to Python (Part 1) Workshop PPT.pptx
+++ b/Slides/QLS-MiCM Intro to Python (Part 1) Workshop PPT.pptx
@@ -9919,7 +9919,7 @@
           <a:p>
             <a:fld id="{9FF74AA5-8A3E-4FDB-94BB-BF4B31CB4E38}" type="datetimeFigureOut">
               <a:rPr lang="en-CA" smtClean="0"/>
-              <a:t>2025-02-07</a:t>
+              <a:t>2025-02-11</a:t>
             </a:fld>
             <a:endParaRPr lang="en-CA"/>
           </a:p>
@@ -10096,7 +10096,7 @@
           <a:p>
             <a:fld id="{217E5156-1B5D-054E-B5B2-E1B1BA160252}" type="datetimeFigureOut">
               <a:rPr lang="fr-FR" smtClean="0"/>
-              <a:t>07/02/2025</a:t>
+              <a:t>11/02/2025</a:t>
             </a:fld>
             <a:endParaRPr lang="fr-FR"/>
           </a:p>
@@ -14023,10 +14023,40 @@
           </a:p>
         </p:txBody>
       </p:sp>
+      <p:pic>
+        <p:nvPicPr>
+          <p:cNvPr id="4" name="Picture 3">
+            <a:extLst>
+              <a:ext uri="{FF2B5EF4-FFF2-40B4-BE49-F238E27FC236}">
+                <a16:creationId xmlns:a16="http://schemas.microsoft.com/office/drawing/2014/main" id="{E097C071-9D51-A0DF-57BF-B0E66E2C37B2}"/>
+              </a:ext>
+            </a:extLst>
+          </p:cNvPr>
+          <p:cNvPicPr>
+            <a:picLocks noChangeAspect="1"/>
+          </p:cNvPicPr>
+          <p:nvPr/>
+        </p:nvPicPr>
+        <p:blipFill>
+          <a:blip r:embed="rId3"/>
+          <a:stretch>
+            <a:fillRect/>
+          </a:stretch>
+        </p:blipFill>
+        <p:spPr>
+          <a:xfrm>
+            <a:off x="3492241" y="2791654"/>
+            <a:ext cx="2159516" cy="2159516"/>
+          </a:xfrm>
+          <a:prstGeom prst="rect">
+            <a:avLst/>
+          </a:prstGeom>
+        </p:spPr>
+      </p:pic>
       <p:sp>
         <p:nvSpPr>
           <p:cNvPr id="5" name="Rectangle 4">
-            <a:hlinkClick r:id="rId3"/>
+            <a:hlinkClick r:id="rId4"/>
             <a:extLst>
               <a:ext uri="{FF2B5EF4-FFF2-40B4-BE49-F238E27FC236}">
                 <a16:creationId xmlns:a16="http://schemas.microsoft.com/office/drawing/2014/main" id="{95D1A3EF-3796-F00E-99F9-355720A79B88}"/>
@@ -14038,7 +14068,7 @@
         </p:nvSpPr>
         <p:spPr>
           <a:xfrm>
-            <a:off x="2292886" y="3394909"/>
+            <a:off x="2293142" y="4806395"/>
             <a:ext cx="4557713" cy="1042988"/>
           </a:xfrm>
           <a:prstGeom prst="rect">

</xml_diff>